<commit_message>
DOCS: Server docs updated for the last time.
</commit_message>
<xml_diff>
--- a/docs/Demo-server.pptx
+++ b/docs/Demo-server.pptx
@@ -113,23 +113,6 @@
     </a:lvl9pPr>
   </p:defaultTextStyle>
   <p:extLst>
-    <p:ext uri="{521415D9-36F7-43E2-AB2F-B90AF26B5E84}">
-      <p14:sectionLst xmlns:p14="http://schemas.microsoft.com/office/powerpoint/2010/main">
-        <p14:section name="Default Section" id="{67F606B2-98CD-46D1-8C86-85533E29BAE6}">
-          <p14:sldIdLst>
-            <p14:sldId id="256"/>
-            <p14:sldId id="258"/>
-            <p14:sldId id="259"/>
-            <p14:sldId id="260"/>
-            <p14:sldId id="261"/>
-            <p14:sldId id="264"/>
-            <p14:sldId id="262"/>
-            <p14:sldId id="257"/>
-            <p14:sldId id="265"/>
-          </p14:sldIdLst>
-        </p14:section>
-      </p14:sectionLst>
-    </p:ext>
     <p:ext uri="{EFAFB233-063F-42B5-8137-9DF3F51BA10A}">
       <p15:sldGuideLst xmlns:p15="http://schemas.microsoft.com/office/powerpoint/2012/main"/>
     </p:ext>
@@ -645,7 +628,7 @@
           <a:p>
             <a:fld id="{0F2DC09D-1417-405A-ADAD-480CF1125B27}" type="datetimeFigureOut">
               <a:rPr lang="en-US" smtClean="0"/>
-              <a:t>6/24/2014</a:t>
+              <a:t>6/28/2014</a:t>
             </a:fld>
             <a:endParaRPr lang="en-US"/>
           </a:p>
@@ -1627,7 +1610,7 @@
           <a:p>
             <a:fld id="{0F2DC09D-1417-405A-ADAD-480CF1125B27}" type="datetimeFigureOut">
               <a:rPr lang="en-US" smtClean="0"/>
-              <a:t>6/24/2014</a:t>
+              <a:t>6/28/2014</a:t>
             </a:fld>
             <a:endParaRPr lang="en-US"/>
           </a:p>
@@ -2497,7 +2480,7 @@
           <a:p>
             <a:fld id="{0F2DC09D-1417-405A-ADAD-480CF1125B27}" type="datetimeFigureOut">
               <a:rPr lang="en-US" smtClean="0"/>
-              <a:t>6/24/2014</a:t>
+              <a:t>6/28/2014</a:t>
             </a:fld>
             <a:endParaRPr lang="en-US"/>
           </a:p>
@@ -3518,7 +3501,7 @@
           <a:p>
             <a:fld id="{0F2DC09D-1417-405A-ADAD-480CF1125B27}" type="datetimeFigureOut">
               <a:rPr lang="en-US" smtClean="0"/>
-              <a:t>6/24/2014</a:t>
+              <a:t>6/28/2014</a:t>
             </a:fld>
             <a:endParaRPr lang="en-US"/>
           </a:p>
@@ -4438,7 +4421,7 @@
           <a:p>
             <a:fld id="{0F2DC09D-1417-405A-ADAD-480CF1125B27}" type="datetimeFigureOut">
               <a:rPr lang="en-US" smtClean="0"/>
-              <a:t>6/24/2014</a:t>
+              <a:t>6/28/2014</a:t>
             </a:fld>
             <a:endParaRPr lang="en-US"/>
           </a:p>
@@ -5094,7 +5077,7 @@
           <a:p>
             <a:fld id="{0F2DC09D-1417-405A-ADAD-480CF1125B27}" type="datetimeFigureOut">
               <a:rPr lang="en-US" smtClean="0"/>
-              <a:t>6/24/2014</a:t>
+              <a:t>6/28/2014</a:t>
             </a:fld>
             <a:endParaRPr lang="en-US"/>
           </a:p>
@@ -5951,7 +5934,7 @@
           <a:p>
             <a:fld id="{0F2DC09D-1417-405A-ADAD-480CF1125B27}" type="datetimeFigureOut">
               <a:rPr lang="en-US" smtClean="0"/>
-              <a:t>6/24/2014</a:t>
+              <a:t>6/28/2014</a:t>
             </a:fld>
             <a:endParaRPr lang="en-US"/>
           </a:p>
@@ -6134,7 +6117,7 @@
           <a:p>
             <a:fld id="{0F2DC09D-1417-405A-ADAD-480CF1125B27}" type="datetimeFigureOut">
               <a:rPr lang="en-US" smtClean="0"/>
-              <a:t>6/24/2014</a:t>
+              <a:t>6/28/2014</a:t>
             </a:fld>
             <a:endParaRPr lang="en-US"/>
           </a:p>
@@ -6991,7 +6974,7 @@
           <a:p>
             <a:fld id="{0F2DC09D-1417-405A-ADAD-480CF1125B27}" type="datetimeFigureOut">
               <a:rPr lang="en-US" smtClean="0"/>
-              <a:t>6/24/2014</a:t>
+              <a:t>6/28/2014</a:t>
             </a:fld>
             <a:endParaRPr lang="en-US"/>
           </a:p>
@@ -7210,7 +7193,7 @@
           <a:p>
             <a:fld id="{0F2DC09D-1417-405A-ADAD-480CF1125B27}" type="datetimeFigureOut">
               <a:rPr lang="en-US" smtClean="0"/>
-              <a:t>6/24/2014</a:t>
+              <a:t>6/28/2014</a:t>
             </a:fld>
             <a:endParaRPr lang="en-US"/>
           </a:p>
@@ -8135,7 +8118,7 @@
           <a:p>
             <a:fld id="{0F2DC09D-1417-405A-ADAD-480CF1125B27}" type="datetimeFigureOut">
               <a:rPr lang="en-US" smtClean="0"/>
-              <a:t>6/24/2014</a:t>
+              <a:t>6/28/2014</a:t>
             </a:fld>
             <a:endParaRPr lang="en-US"/>
           </a:p>
@@ -8419,7 +8402,7 @@
           <a:p>
             <a:fld id="{0F2DC09D-1417-405A-ADAD-480CF1125B27}" type="datetimeFigureOut">
               <a:rPr lang="en-US" smtClean="0"/>
-              <a:t>6/24/2014</a:t>
+              <a:t>6/28/2014</a:t>
             </a:fld>
             <a:endParaRPr lang="en-US"/>
           </a:p>
@@ -8809,7 +8792,7 @@
           <a:p>
             <a:fld id="{0F2DC09D-1417-405A-ADAD-480CF1125B27}" type="datetimeFigureOut">
               <a:rPr lang="en-US" smtClean="0"/>
-              <a:t>6/24/2014</a:t>
+              <a:t>6/28/2014</a:t>
             </a:fld>
             <a:endParaRPr lang="en-US"/>
           </a:p>
@@ -8935,7 +8918,7 @@
           <a:p>
             <a:fld id="{0F2DC09D-1417-405A-ADAD-480CF1125B27}" type="datetimeFigureOut">
               <a:rPr lang="en-US" smtClean="0"/>
-              <a:t>6/24/2014</a:t>
+              <a:t>6/28/2014</a:t>
             </a:fld>
             <a:endParaRPr lang="en-US"/>
           </a:p>
@@ -9030,7 +9013,7 @@
           <a:p>
             <a:fld id="{0F2DC09D-1417-405A-ADAD-480CF1125B27}" type="datetimeFigureOut">
               <a:rPr lang="en-US" smtClean="0"/>
-              <a:t>6/24/2014</a:t>
+              <a:t>6/28/2014</a:t>
             </a:fld>
             <a:endParaRPr lang="en-US"/>
           </a:p>
@@ -10001,7 +9984,7 @@
           <a:p>
             <a:fld id="{0F2DC09D-1417-405A-ADAD-480CF1125B27}" type="datetimeFigureOut">
               <a:rPr lang="en-US" smtClean="0"/>
-              <a:t>6/24/2014</a:t>
+              <a:t>6/28/2014</a:t>
             </a:fld>
             <a:endParaRPr lang="en-US"/>
           </a:p>
@@ -10996,7 +10979,7 @@
           <a:p>
             <a:fld id="{0F2DC09D-1417-405A-ADAD-480CF1125B27}" type="datetimeFigureOut">
               <a:rPr lang="en-US" smtClean="0"/>
-              <a:t>6/24/2014</a:t>
+              <a:t>6/28/2014</a:t>
             </a:fld>
             <a:endParaRPr lang="en-US"/>
           </a:p>
@@ -11880,7 +11863,7 @@
           <a:p>
             <a:fld id="{0F2DC09D-1417-405A-ADAD-480CF1125B27}" type="datetimeFigureOut">
               <a:rPr lang="en-US" smtClean="0"/>
-              <a:t>6/24/2014</a:t>
+              <a:t>6/28/2014</a:t>
             </a:fld>
             <a:endParaRPr lang="en-US"/>
           </a:p>
@@ -12697,10 +12680,15 @@
             <p:ph type="title"/>
           </p:nvPr>
         </p:nvSpPr>
-        <p:spPr/>
+        <p:spPr>
+          <a:xfrm>
+            <a:off x="1154954" y="973669"/>
+            <a:ext cx="9404189" cy="706964"/>
+          </a:xfrm>
+        </p:spPr>
         <p:txBody>
           <a:bodyPr>
-            <a:normAutofit fontScale="90000"/>
+            <a:noAutofit/>
           </a:bodyPr>
           <a:lstStyle/>
           <a:p>
@@ -13139,26 +13127,31 @@
             <p:ph type="title"/>
           </p:nvPr>
         </p:nvSpPr>
-        <p:spPr/>
+        <p:spPr>
+          <a:xfrm>
+            <a:off x="1154954" y="973669"/>
+            <a:ext cx="10340360" cy="946242"/>
+          </a:xfrm>
+        </p:spPr>
         <p:txBody>
           <a:bodyPr>
-            <a:normAutofit fontScale="90000"/>
+            <a:noAutofit/>
           </a:bodyPr>
           <a:lstStyle/>
           <a:p>
             <a:r>
-              <a:rPr lang="ru-RU" dirty="0" smtClean="0"/>
+              <a:rPr lang="ru-RU" sz="3200" dirty="0" smtClean="0"/>
               <a:t>Реализация протокола</a:t>
             </a:r>
             <a:r>
-              <a:rPr lang="en-US" dirty="0" smtClean="0"/>
+              <a:rPr lang="en-US" sz="3200" dirty="0" smtClean="0"/>
               <a:t>: </a:t>
             </a:r>
             <a:r>
-              <a:rPr lang="ru-RU" dirty="0" smtClean="0"/>
+              <a:rPr lang="ru-RU" sz="3200" dirty="0" smtClean="0"/>
               <a:t>серверное приложение</a:t>
             </a:r>
-            <a:endParaRPr lang="en-US" dirty="0"/>
+            <a:endParaRPr lang="en-US" sz="3200" dirty="0"/>
           </a:p>
         </p:txBody>
       </p:sp>
@@ -14368,7 +14361,13 @@
               <a:rPr lang="ru-RU" sz="1900" dirty="0">
                 <a:effectLst/>
               </a:rPr>
-              <a:t>Запуск программы.</a:t>
+              <a:t>Запуск </a:t>
+            </a:r>
+            <a:r>
+              <a:rPr lang="ru-RU" sz="1900" dirty="0" smtClean="0">
+                <a:effectLst/>
+              </a:rPr>
+              <a:t>программы</a:t>
             </a:r>
             <a:endParaRPr lang="en-US" sz="1900" dirty="0">
               <a:effectLst/>
@@ -14383,7 +14382,13 @@
               <a:rPr lang="ru-RU" sz="1900" dirty="0">
                 <a:effectLst/>
               </a:rPr>
-              <a:t>Начало инициализации и чтения настроек.</a:t>
+              <a:t>Начало инициализации и чтения </a:t>
+            </a:r>
+            <a:r>
+              <a:rPr lang="ru-RU" sz="1900" dirty="0" smtClean="0">
+                <a:effectLst/>
+              </a:rPr>
+              <a:t>настроек</a:t>
             </a:r>
             <a:endParaRPr lang="en-US" sz="1900" dirty="0">
               <a:effectLst/>
@@ -14398,7 +14403,13 @@
               <a:rPr lang="ru-RU" sz="1900" dirty="0">
                 <a:effectLst/>
               </a:rPr>
-              <a:t>Попытка соединения с базой данных.</a:t>
+              <a:t>Попытка соединения с базой </a:t>
+            </a:r>
+            <a:r>
+              <a:rPr lang="ru-RU" sz="1900" dirty="0" smtClean="0">
+                <a:effectLst/>
+              </a:rPr>
+              <a:t>данных</a:t>
             </a:r>
             <a:endParaRPr lang="en-US" sz="1900" dirty="0">
               <a:effectLst/>
@@ -14461,10 +14472,10 @@
               <a:t>ini</a:t>
             </a:r>
             <a:r>
-              <a:rPr lang="ru-RU" sz="1900" dirty="0">
+              <a:rPr lang="ru-RU" sz="1900" dirty="0" smtClean="0">
                 <a:effectLst/>
               </a:rPr>
-              <a:t>).</a:t>
+              <a:t>)</a:t>
             </a:r>
             <a:endParaRPr lang="en-US" sz="1900" dirty="0">
               <a:effectLst/>
@@ -14479,7 +14490,13 @@
               <a:rPr lang="ru-RU" sz="1900" dirty="0">
                 <a:effectLst/>
               </a:rPr>
-              <a:t>Входящее соединение.</a:t>
+              <a:t>Входящее </a:t>
+            </a:r>
+            <a:r>
+              <a:rPr lang="ru-RU" sz="1900" dirty="0" smtClean="0">
+                <a:effectLst/>
+              </a:rPr>
+              <a:t>соединение</a:t>
             </a:r>
             <a:endParaRPr lang="en-US" sz="1900" dirty="0">
               <a:effectLst/>
@@ -14494,7 +14511,13 @@
               <a:rPr lang="ru-RU" sz="1900" dirty="0">
                 <a:effectLst/>
               </a:rPr>
-              <a:t>Описание установления безопасного соединения.</a:t>
+              <a:t>Описание установления безопасного </a:t>
+            </a:r>
+            <a:r>
+              <a:rPr lang="ru-RU" sz="1900" dirty="0" smtClean="0">
+                <a:effectLst/>
+              </a:rPr>
+              <a:t>соединения</a:t>
             </a:r>
             <a:endParaRPr lang="en-US" sz="1900" dirty="0">
               <a:effectLst/>
@@ -14509,7 +14532,13 @@
               <a:rPr lang="ru-RU" sz="1900" dirty="0">
                 <a:effectLst/>
               </a:rPr>
-              <a:t>Попытка войти в систему успешна.</a:t>
+              <a:t>Попытка войти в систему </a:t>
+            </a:r>
+            <a:r>
+              <a:rPr lang="ru-RU" sz="1900" dirty="0" smtClean="0">
+                <a:effectLst/>
+              </a:rPr>
+              <a:t>успешна</a:t>
             </a:r>
             <a:endParaRPr lang="en-US" sz="1900" dirty="0">
               <a:effectLst/>
@@ -14524,7 +14553,13 @@
               <a:rPr lang="ru-RU" sz="1900" dirty="0">
                 <a:effectLst/>
               </a:rPr>
-              <a:t>Соединение завершается по запросу клиента.</a:t>
+              <a:t>Соединение завершается по запросу </a:t>
+            </a:r>
+            <a:r>
+              <a:rPr lang="ru-RU" sz="1900" dirty="0" smtClean="0">
+                <a:effectLst/>
+              </a:rPr>
+              <a:t>клиента</a:t>
             </a:r>
             <a:endParaRPr lang="en-US" sz="1900" dirty="0">
               <a:effectLst/>
@@ -14539,7 +14574,13 @@
               <a:rPr lang="ru-RU" sz="1900" dirty="0">
                 <a:effectLst/>
               </a:rPr>
-              <a:t>Другое входящее соединение.</a:t>
+              <a:t>Другое входящее </a:t>
+            </a:r>
+            <a:r>
+              <a:rPr lang="ru-RU" sz="1900" dirty="0" smtClean="0">
+                <a:effectLst/>
+              </a:rPr>
+              <a:t>соединение</a:t>
             </a:r>
             <a:endParaRPr lang="en-US" sz="1900" dirty="0">
               <a:effectLst/>
@@ -14554,7 +14595,13 @@
               <a:rPr lang="ru-RU" sz="1900" dirty="0">
                 <a:effectLst/>
               </a:rPr>
-              <a:t>Безопасное соединение установлено.</a:t>
+              <a:t>Безопасное соединение </a:t>
+            </a:r>
+            <a:r>
+              <a:rPr lang="ru-RU" sz="1900" dirty="0" smtClean="0">
+                <a:effectLst/>
+              </a:rPr>
+              <a:t>установлено</a:t>
             </a:r>
             <a:endParaRPr lang="en-US" sz="1900" dirty="0">
               <a:effectLst/>
@@ -14581,7 +14628,13 @@
               <a:rPr lang="ru-RU" sz="1900" dirty="0">
                 <a:effectLst/>
               </a:rPr>
-              <a:t>отсутствует точка с запятой).</a:t>
+              <a:t>отсутствует точка с запятой</a:t>
+            </a:r>
+            <a:r>
+              <a:rPr lang="ru-RU" sz="1900" dirty="0" smtClean="0">
+                <a:effectLst/>
+              </a:rPr>
+              <a:t>)</a:t>
             </a:r>
             <a:endParaRPr lang="en-US" sz="1900" dirty="0">
               <a:effectLst/>

</xml_diff>